<commit_message>
Alteração no slide de desenho de solução
</commit_message>
<xml_diff>
--- a/Documentação/Desenhos de solução.pptx
+++ b/Documentação/Desenhos de solução.pptx
@@ -123,6 +123,7 @@
     <p1510:client id="{A692254C-F7FA-7081-7460-7A82AED9980F}" v="27" dt="2020-04-01T22:06:33.163"/>
     <p1510:client id="{CE029E28-F64C-B628-6A0E-0B4FB4F6BC51}" v="6" dt="2020-04-01T23:34:03.484"/>
     <p1510:client id="{D56B0283-150A-D116-1BE8-495173E77391}" v="2" dt="2020-04-01T20:17:30.015"/>
+    <p1510:client id="{F104D89C-4FBA-DBDD-E24B-24F786E1D6FC}" v="122" dt="2020-04-14T18:12:34.987"/>
   </p1510:revLst>
 </p1510:revInfo>
 </file>
@@ -258,7 +259,7 @@
           <a:p>
             <a:fld id="{846CE7D5-CF57-46EF-B807-FDD0502418D4}" type="datetimeFigureOut">
               <a:rPr lang="en-US" smtClean="0"/>
-              <a:t>4/8/2020</a:t>
+              <a:t>4/14/2020</a:t>
             </a:fld>
             <a:endParaRPr lang="en-US"/>
           </a:p>
@@ -428,7 +429,7 @@
           <a:p>
             <a:fld id="{846CE7D5-CF57-46EF-B807-FDD0502418D4}" type="datetimeFigureOut">
               <a:rPr lang="en-US" smtClean="0"/>
-              <a:t>4/8/2020</a:t>
+              <a:t>4/14/2020</a:t>
             </a:fld>
             <a:endParaRPr lang="en-US"/>
           </a:p>
@@ -608,7 +609,7 @@
           <a:p>
             <a:fld id="{846CE7D5-CF57-46EF-B807-FDD0502418D4}" type="datetimeFigureOut">
               <a:rPr lang="en-US" smtClean="0"/>
-              <a:t>4/8/2020</a:t>
+              <a:t>4/14/2020</a:t>
             </a:fld>
             <a:endParaRPr lang="en-US"/>
           </a:p>
@@ -778,7 +779,7 @@
           <a:p>
             <a:fld id="{846CE7D5-CF57-46EF-B807-FDD0502418D4}" type="datetimeFigureOut">
               <a:rPr lang="en-US" smtClean="0"/>
-              <a:t>4/8/2020</a:t>
+              <a:t>4/14/2020</a:t>
             </a:fld>
             <a:endParaRPr lang="en-US"/>
           </a:p>
@@ -1024,7 +1025,7 @@
           <a:p>
             <a:fld id="{846CE7D5-CF57-46EF-B807-FDD0502418D4}" type="datetimeFigureOut">
               <a:rPr lang="en-US" smtClean="0"/>
-              <a:t>4/8/2020</a:t>
+              <a:t>4/14/2020</a:t>
             </a:fld>
             <a:endParaRPr lang="en-US"/>
           </a:p>
@@ -1256,7 +1257,7 @@
           <a:p>
             <a:fld id="{846CE7D5-CF57-46EF-B807-FDD0502418D4}" type="datetimeFigureOut">
               <a:rPr lang="en-US" smtClean="0"/>
-              <a:t>4/8/2020</a:t>
+              <a:t>4/14/2020</a:t>
             </a:fld>
             <a:endParaRPr lang="en-US"/>
           </a:p>
@@ -1623,7 +1624,7 @@
           <a:p>
             <a:fld id="{846CE7D5-CF57-46EF-B807-FDD0502418D4}" type="datetimeFigureOut">
               <a:rPr lang="en-US" smtClean="0"/>
-              <a:t>4/8/2020</a:t>
+              <a:t>4/14/2020</a:t>
             </a:fld>
             <a:endParaRPr lang="en-US"/>
           </a:p>
@@ -1741,7 +1742,7 @@
           <a:p>
             <a:fld id="{846CE7D5-CF57-46EF-B807-FDD0502418D4}" type="datetimeFigureOut">
               <a:rPr lang="en-US" smtClean="0"/>
-              <a:t>4/8/2020</a:t>
+              <a:t>4/14/2020</a:t>
             </a:fld>
             <a:endParaRPr lang="en-US"/>
           </a:p>
@@ -1836,7 +1837,7 @@
           <a:p>
             <a:fld id="{846CE7D5-CF57-46EF-B807-FDD0502418D4}" type="datetimeFigureOut">
               <a:rPr lang="en-US" smtClean="0"/>
-              <a:t>4/8/2020</a:t>
+              <a:t>4/14/2020</a:t>
             </a:fld>
             <a:endParaRPr lang="en-US"/>
           </a:p>
@@ -2113,7 +2114,7 @@
           <a:p>
             <a:fld id="{846CE7D5-CF57-46EF-B807-FDD0502418D4}" type="datetimeFigureOut">
               <a:rPr lang="en-US" smtClean="0"/>
-              <a:t>4/8/2020</a:t>
+              <a:t>4/14/2020</a:t>
             </a:fld>
             <a:endParaRPr lang="en-US"/>
           </a:p>
@@ -2370,7 +2371,7 @@
           <a:p>
             <a:fld id="{846CE7D5-CF57-46EF-B807-FDD0502418D4}" type="datetimeFigureOut">
               <a:rPr lang="en-US" smtClean="0"/>
-              <a:t>4/8/2020</a:t>
+              <a:t>4/14/2020</a:t>
             </a:fld>
             <a:endParaRPr lang="en-US"/>
           </a:p>
@@ -2583,7 +2584,7 @@
           <a:p>
             <a:fld id="{846CE7D5-CF57-46EF-B807-FDD0502418D4}" type="datetimeFigureOut">
               <a:rPr lang="en-US" smtClean="0"/>
-              <a:t>4/8/2020</a:t>
+              <a:t>4/14/2020</a:t>
             </a:fld>
             <a:endParaRPr lang="en-US"/>
           </a:p>
@@ -2990,10 +2991,10 @@
       </p:grpSpPr>
       <p:pic>
         <p:nvPicPr>
-          <p:cNvPr id="2" name="Imagem 12">
+          <p:cNvPr id="3" name="Imagem 14">
             <a:extLst>
               <a:ext uri="{FF2B5EF4-FFF2-40B4-BE49-F238E27FC236}">
-                <a16:creationId xmlns:a16="http://schemas.microsoft.com/office/drawing/2014/main" id="{5FE0E0CD-6C14-4A3E-8E89-B2615BCA42E3}"/>
+                <a16:creationId xmlns:a16="http://schemas.microsoft.com/office/drawing/2014/main" id="{0102D479-09C2-49DB-A04B-2D35F705A0C8}"/>
               </a:ext>
             </a:extLst>
           </p:cNvPr>
@@ -3016,20 +3017,424 @@
         </p:blipFill>
         <p:spPr>
           <a:xfrm>
-            <a:off x="567021" y="2057206"/>
-            <a:ext cx="2113773" cy="1453998"/>
+            <a:off x="3548139" y="2053750"/>
+            <a:ext cx="2332204" cy="1636263"/>
           </a:xfrm>
           <a:prstGeom prst="rect">
             <a:avLst/>
           </a:prstGeom>
         </p:spPr>
       </p:pic>
+      <p:sp>
+        <p:nvSpPr>
+          <p:cNvPr id="4" name="CaixaDeTexto 17">
+            <a:extLst>
+              <a:ext uri="{FF2B5EF4-FFF2-40B4-BE49-F238E27FC236}">
+                <a16:creationId xmlns:a16="http://schemas.microsoft.com/office/drawing/2014/main" id="{8654993B-C2B9-4E5E-BA14-277418993EF0}"/>
+              </a:ext>
+            </a:extLst>
+          </p:cNvPr>
+          <p:cNvSpPr txBox="1"/>
+          <p:nvPr/>
+        </p:nvSpPr>
+        <p:spPr>
+          <a:xfrm>
+            <a:off x="3337897" y="3487126"/>
+            <a:ext cx="2592881" cy="1323439"/>
+          </a:xfrm>
+          <a:prstGeom prst="rect">
+            <a:avLst/>
+          </a:prstGeom>
+          <a:noFill/>
+        </p:spPr>
+        <p:txBody>
+          <a:bodyPr wrap="square" rtlCol="0" anchor="t">
+            <a:spAutoFit/>
+          </a:bodyPr>
+          <a:lstStyle>
+            <a:defPPr>
+              <a:defRPr lang="pt-BR"/>
+            </a:defPPr>
+            <a:lvl1pPr marL="0" algn="l" defTabSz="914400" rtl="0" eaLnBrk="1" latinLnBrk="0" hangingPunct="1">
+              <a:defRPr sz="1800" kern="1200">
+                <a:solidFill>
+                  <a:schemeClr val="tx1"/>
+                </a:solidFill>
+                <a:latin typeface="+mn-lt"/>
+                <a:ea typeface="+mn-ea"/>
+                <a:cs typeface="+mn-cs"/>
+              </a:defRPr>
+            </a:lvl1pPr>
+            <a:lvl2pPr marL="457200" algn="l" defTabSz="914400" rtl="0" eaLnBrk="1" latinLnBrk="0" hangingPunct="1">
+              <a:defRPr sz="1800" kern="1200">
+                <a:solidFill>
+                  <a:schemeClr val="tx1"/>
+                </a:solidFill>
+                <a:latin typeface="+mn-lt"/>
+                <a:ea typeface="+mn-ea"/>
+                <a:cs typeface="+mn-cs"/>
+              </a:defRPr>
+            </a:lvl2pPr>
+            <a:lvl3pPr marL="914400" algn="l" defTabSz="914400" rtl="0" eaLnBrk="1" latinLnBrk="0" hangingPunct="1">
+              <a:defRPr sz="1800" kern="1200">
+                <a:solidFill>
+                  <a:schemeClr val="tx1"/>
+                </a:solidFill>
+                <a:latin typeface="+mn-lt"/>
+                <a:ea typeface="+mn-ea"/>
+                <a:cs typeface="+mn-cs"/>
+              </a:defRPr>
+            </a:lvl3pPr>
+            <a:lvl4pPr marL="1371600" algn="l" defTabSz="914400" rtl="0" eaLnBrk="1" latinLnBrk="0" hangingPunct="1">
+              <a:defRPr sz="1800" kern="1200">
+                <a:solidFill>
+                  <a:schemeClr val="tx1"/>
+                </a:solidFill>
+                <a:latin typeface="+mn-lt"/>
+                <a:ea typeface="+mn-ea"/>
+                <a:cs typeface="+mn-cs"/>
+              </a:defRPr>
+            </a:lvl4pPr>
+            <a:lvl5pPr marL="1828800" algn="l" defTabSz="914400" rtl="0" eaLnBrk="1" latinLnBrk="0" hangingPunct="1">
+              <a:defRPr sz="1800" kern="1200">
+                <a:solidFill>
+                  <a:schemeClr val="tx1"/>
+                </a:solidFill>
+                <a:latin typeface="+mn-lt"/>
+                <a:ea typeface="+mn-ea"/>
+                <a:cs typeface="+mn-cs"/>
+              </a:defRPr>
+            </a:lvl5pPr>
+            <a:lvl6pPr marL="2286000" algn="l" defTabSz="914400" rtl="0" eaLnBrk="1" latinLnBrk="0" hangingPunct="1">
+              <a:defRPr sz="1800" kern="1200">
+                <a:solidFill>
+                  <a:schemeClr val="tx1"/>
+                </a:solidFill>
+                <a:latin typeface="+mn-lt"/>
+                <a:ea typeface="+mn-ea"/>
+                <a:cs typeface="+mn-cs"/>
+              </a:defRPr>
+            </a:lvl6pPr>
+            <a:lvl7pPr marL="2743200" algn="l" defTabSz="914400" rtl="0" eaLnBrk="1" latinLnBrk="0" hangingPunct="1">
+              <a:defRPr sz="1800" kern="1200">
+                <a:solidFill>
+                  <a:schemeClr val="tx1"/>
+                </a:solidFill>
+                <a:latin typeface="+mn-lt"/>
+                <a:ea typeface="+mn-ea"/>
+                <a:cs typeface="+mn-cs"/>
+              </a:defRPr>
+            </a:lvl7pPr>
+            <a:lvl8pPr marL="3200400" algn="l" defTabSz="914400" rtl="0" eaLnBrk="1" latinLnBrk="0" hangingPunct="1">
+              <a:defRPr sz="1800" kern="1200">
+                <a:solidFill>
+                  <a:schemeClr val="tx1"/>
+                </a:solidFill>
+                <a:latin typeface="+mn-lt"/>
+                <a:ea typeface="+mn-ea"/>
+                <a:cs typeface="+mn-cs"/>
+              </a:defRPr>
+            </a:lvl8pPr>
+            <a:lvl9pPr marL="3657600" algn="l" defTabSz="914400" rtl="0" eaLnBrk="1" latinLnBrk="0" hangingPunct="1">
+              <a:defRPr sz="1800" kern="1200">
+                <a:solidFill>
+                  <a:schemeClr val="tx1"/>
+                </a:solidFill>
+                <a:latin typeface="+mn-lt"/>
+                <a:ea typeface="+mn-ea"/>
+                <a:cs typeface="+mn-cs"/>
+              </a:defRPr>
+            </a:lvl9pPr>
+          </a:lstStyle>
+          <a:p>
+            <a:pPr algn="ctr"/>
+            <a:r>
+              <a:rPr lang="pt-BR" sz="1600" dirty="0">
+                <a:latin typeface="Bariol Bold" panose="02000506040000020003"/>
+                <a:cs typeface="Arial"/>
+              </a:rPr>
+              <a:t>O  sistema web determina com esses dados o nível de circulação de pessoas em um determinado local da estação.</a:t>
+            </a:r>
+          </a:p>
+        </p:txBody>
+      </p:sp>
+      <p:sp>
+        <p:nvSpPr>
+          <p:cNvPr id="5" name="CaixaDeTexto 18">
+            <a:extLst>
+              <a:ext uri="{FF2B5EF4-FFF2-40B4-BE49-F238E27FC236}">
+                <a16:creationId xmlns:a16="http://schemas.microsoft.com/office/drawing/2014/main" id="{1B2E5927-A1FF-4781-8F5A-3031D47EFCC5}"/>
+              </a:ext>
+            </a:extLst>
+          </p:cNvPr>
+          <p:cNvSpPr txBox="1"/>
+          <p:nvPr/>
+        </p:nvSpPr>
+        <p:spPr>
+          <a:xfrm>
+            <a:off x="338421" y="3582067"/>
+            <a:ext cx="2434584" cy="1077218"/>
+          </a:xfrm>
+          <a:prstGeom prst="rect">
+            <a:avLst/>
+          </a:prstGeom>
+          <a:noFill/>
+        </p:spPr>
+        <p:txBody>
+          <a:bodyPr wrap="square" rtlCol="0" anchor="t">
+            <a:spAutoFit/>
+          </a:bodyPr>
+          <a:lstStyle>
+            <a:defPPr>
+              <a:defRPr lang="pt-BR"/>
+            </a:defPPr>
+            <a:lvl1pPr marL="0" algn="l" defTabSz="914400" rtl="0" eaLnBrk="1" latinLnBrk="0" hangingPunct="1">
+              <a:defRPr sz="1800" kern="1200">
+                <a:solidFill>
+                  <a:schemeClr val="tx1"/>
+                </a:solidFill>
+                <a:latin typeface="+mn-lt"/>
+                <a:ea typeface="+mn-ea"/>
+                <a:cs typeface="+mn-cs"/>
+              </a:defRPr>
+            </a:lvl1pPr>
+            <a:lvl2pPr marL="457200" algn="l" defTabSz="914400" rtl="0" eaLnBrk="1" latinLnBrk="0" hangingPunct="1">
+              <a:defRPr sz="1800" kern="1200">
+                <a:solidFill>
+                  <a:schemeClr val="tx1"/>
+                </a:solidFill>
+                <a:latin typeface="+mn-lt"/>
+                <a:ea typeface="+mn-ea"/>
+                <a:cs typeface="+mn-cs"/>
+              </a:defRPr>
+            </a:lvl2pPr>
+            <a:lvl3pPr marL="914400" algn="l" defTabSz="914400" rtl="0" eaLnBrk="1" latinLnBrk="0" hangingPunct="1">
+              <a:defRPr sz="1800" kern="1200">
+                <a:solidFill>
+                  <a:schemeClr val="tx1"/>
+                </a:solidFill>
+                <a:latin typeface="+mn-lt"/>
+                <a:ea typeface="+mn-ea"/>
+                <a:cs typeface="+mn-cs"/>
+              </a:defRPr>
+            </a:lvl3pPr>
+            <a:lvl4pPr marL="1371600" algn="l" defTabSz="914400" rtl="0" eaLnBrk="1" latinLnBrk="0" hangingPunct="1">
+              <a:defRPr sz="1800" kern="1200">
+                <a:solidFill>
+                  <a:schemeClr val="tx1"/>
+                </a:solidFill>
+                <a:latin typeface="+mn-lt"/>
+                <a:ea typeface="+mn-ea"/>
+                <a:cs typeface="+mn-cs"/>
+              </a:defRPr>
+            </a:lvl4pPr>
+            <a:lvl5pPr marL="1828800" algn="l" defTabSz="914400" rtl="0" eaLnBrk="1" latinLnBrk="0" hangingPunct="1">
+              <a:defRPr sz="1800" kern="1200">
+                <a:solidFill>
+                  <a:schemeClr val="tx1"/>
+                </a:solidFill>
+                <a:latin typeface="+mn-lt"/>
+                <a:ea typeface="+mn-ea"/>
+                <a:cs typeface="+mn-cs"/>
+              </a:defRPr>
+            </a:lvl5pPr>
+            <a:lvl6pPr marL="2286000" algn="l" defTabSz="914400" rtl="0" eaLnBrk="1" latinLnBrk="0" hangingPunct="1">
+              <a:defRPr sz="1800" kern="1200">
+                <a:solidFill>
+                  <a:schemeClr val="tx1"/>
+                </a:solidFill>
+                <a:latin typeface="+mn-lt"/>
+                <a:ea typeface="+mn-ea"/>
+                <a:cs typeface="+mn-cs"/>
+              </a:defRPr>
+            </a:lvl6pPr>
+            <a:lvl7pPr marL="2743200" algn="l" defTabSz="914400" rtl="0" eaLnBrk="1" latinLnBrk="0" hangingPunct="1">
+              <a:defRPr sz="1800" kern="1200">
+                <a:solidFill>
+                  <a:schemeClr val="tx1"/>
+                </a:solidFill>
+                <a:latin typeface="+mn-lt"/>
+                <a:ea typeface="+mn-ea"/>
+                <a:cs typeface="+mn-cs"/>
+              </a:defRPr>
+            </a:lvl7pPr>
+            <a:lvl8pPr marL="3200400" algn="l" defTabSz="914400" rtl="0" eaLnBrk="1" latinLnBrk="0" hangingPunct="1">
+              <a:defRPr sz="1800" kern="1200">
+                <a:solidFill>
+                  <a:schemeClr val="tx1"/>
+                </a:solidFill>
+                <a:latin typeface="+mn-lt"/>
+                <a:ea typeface="+mn-ea"/>
+                <a:cs typeface="+mn-cs"/>
+              </a:defRPr>
+            </a:lvl8pPr>
+            <a:lvl9pPr marL="3657600" algn="l" defTabSz="914400" rtl="0" eaLnBrk="1" latinLnBrk="0" hangingPunct="1">
+              <a:defRPr sz="1800" kern="1200">
+                <a:solidFill>
+                  <a:schemeClr val="tx1"/>
+                </a:solidFill>
+                <a:latin typeface="+mn-lt"/>
+                <a:ea typeface="+mn-ea"/>
+                <a:cs typeface="+mn-cs"/>
+              </a:defRPr>
+            </a:lvl9pPr>
+          </a:lstStyle>
+          <a:p>
+            <a:pPr algn="ctr"/>
+            <a:r>
+              <a:rPr lang="pt-BR" sz="1600" dirty="0">
+                <a:latin typeface="Bariol Bold" panose="02000506040000020003"/>
+                <a:cs typeface="Arial"/>
+              </a:rPr>
+              <a:t>Coleta de dados através de sensor óptico reflexivo em estações do metrô.</a:t>
+            </a:r>
+          </a:p>
+          <a:p>
+            <a:endParaRPr lang="pt-BR" sz="1600" dirty="0">
+              <a:latin typeface="Bariol Bold" panose="02000506040000020003"/>
+            </a:endParaRPr>
+          </a:p>
+        </p:txBody>
+      </p:sp>
+      <p:sp>
+        <p:nvSpPr>
+          <p:cNvPr id="6" name="CaixaDeTexto 19">
+            <a:extLst>
+              <a:ext uri="{FF2B5EF4-FFF2-40B4-BE49-F238E27FC236}">
+                <a16:creationId xmlns:a16="http://schemas.microsoft.com/office/drawing/2014/main" id="{D90E817B-B8F8-478D-882E-57FF9F8629F6}"/>
+              </a:ext>
+            </a:extLst>
+          </p:cNvPr>
+          <p:cNvSpPr txBox="1"/>
+          <p:nvPr/>
+        </p:nvSpPr>
+        <p:spPr>
+          <a:xfrm>
+            <a:off x="6313814" y="3581069"/>
+            <a:ext cx="2600438" cy="1077218"/>
+          </a:xfrm>
+          <a:prstGeom prst="rect">
+            <a:avLst/>
+          </a:prstGeom>
+          <a:noFill/>
+        </p:spPr>
+        <p:txBody>
+          <a:bodyPr wrap="square" rtlCol="0" anchor="t">
+            <a:spAutoFit/>
+          </a:bodyPr>
+          <a:lstStyle>
+            <a:defPPr>
+              <a:defRPr lang="pt-BR"/>
+            </a:defPPr>
+            <a:lvl1pPr marL="0" algn="l" defTabSz="914400" rtl="0" eaLnBrk="1" latinLnBrk="0" hangingPunct="1">
+              <a:defRPr sz="1800" kern="1200">
+                <a:solidFill>
+                  <a:schemeClr val="tx1"/>
+                </a:solidFill>
+                <a:latin typeface="+mn-lt"/>
+                <a:ea typeface="+mn-ea"/>
+                <a:cs typeface="+mn-cs"/>
+              </a:defRPr>
+            </a:lvl1pPr>
+            <a:lvl2pPr marL="457200" algn="l" defTabSz="914400" rtl="0" eaLnBrk="1" latinLnBrk="0" hangingPunct="1">
+              <a:defRPr sz="1800" kern="1200">
+                <a:solidFill>
+                  <a:schemeClr val="tx1"/>
+                </a:solidFill>
+                <a:latin typeface="+mn-lt"/>
+                <a:ea typeface="+mn-ea"/>
+                <a:cs typeface="+mn-cs"/>
+              </a:defRPr>
+            </a:lvl2pPr>
+            <a:lvl3pPr marL="914400" algn="l" defTabSz="914400" rtl="0" eaLnBrk="1" latinLnBrk="0" hangingPunct="1">
+              <a:defRPr sz="1800" kern="1200">
+                <a:solidFill>
+                  <a:schemeClr val="tx1"/>
+                </a:solidFill>
+                <a:latin typeface="+mn-lt"/>
+                <a:ea typeface="+mn-ea"/>
+                <a:cs typeface="+mn-cs"/>
+              </a:defRPr>
+            </a:lvl3pPr>
+            <a:lvl4pPr marL="1371600" algn="l" defTabSz="914400" rtl="0" eaLnBrk="1" latinLnBrk="0" hangingPunct="1">
+              <a:defRPr sz="1800" kern="1200">
+                <a:solidFill>
+                  <a:schemeClr val="tx1"/>
+                </a:solidFill>
+                <a:latin typeface="+mn-lt"/>
+                <a:ea typeface="+mn-ea"/>
+                <a:cs typeface="+mn-cs"/>
+              </a:defRPr>
+            </a:lvl4pPr>
+            <a:lvl5pPr marL="1828800" algn="l" defTabSz="914400" rtl="0" eaLnBrk="1" latinLnBrk="0" hangingPunct="1">
+              <a:defRPr sz="1800" kern="1200">
+                <a:solidFill>
+                  <a:schemeClr val="tx1"/>
+                </a:solidFill>
+                <a:latin typeface="+mn-lt"/>
+                <a:ea typeface="+mn-ea"/>
+                <a:cs typeface="+mn-cs"/>
+              </a:defRPr>
+            </a:lvl5pPr>
+            <a:lvl6pPr marL="2286000" algn="l" defTabSz="914400" rtl="0" eaLnBrk="1" latinLnBrk="0" hangingPunct="1">
+              <a:defRPr sz="1800" kern="1200">
+                <a:solidFill>
+                  <a:schemeClr val="tx1"/>
+                </a:solidFill>
+                <a:latin typeface="+mn-lt"/>
+                <a:ea typeface="+mn-ea"/>
+                <a:cs typeface="+mn-cs"/>
+              </a:defRPr>
+            </a:lvl6pPr>
+            <a:lvl7pPr marL="2743200" algn="l" defTabSz="914400" rtl="0" eaLnBrk="1" latinLnBrk="0" hangingPunct="1">
+              <a:defRPr sz="1800" kern="1200">
+                <a:solidFill>
+                  <a:schemeClr val="tx1"/>
+                </a:solidFill>
+                <a:latin typeface="+mn-lt"/>
+                <a:ea typeface="+mn-ea"/>
+                <a:cs typeface="+mn-cs"/>
+              </a:defRPr>
+            </a:lvl7pPr>
+            <a:lvl8pPr marL="3200400" algn="l" defTabSz="914400" rtl="0" eaLnBrk="1" latinLnBrk="0" hangingPunct="1">
+              <a:defRPr sz="1800" kern="1200">
+                <a:solidFill>
+                  <a:schemeClr val="tx1"/>
+                </a:solidFill>
+                <a:latin typeface="+mn-lt"/>
+                <a:ea typeface="+mn-ea"/>
+                <a:cs typeface="+mn-cs"/>
+              </a:defRPr>
+            </a:lvl8pPr>
+            <a:lvl9pPr marL="3657600" algn="l" defTabSz="914400" rtl="0" eaLnBrk="1" latinLnBrk="0" hangingPunct="1">
+              <a:defRPr sz="1800" kern="1200">
+                <a:solidFill>
+                  <a:schemeClr val="tx1"/>
+                </a:solidFill>
+                <a:latin typeface="+mn-lt"/>
+                <a:ea typeface="+mn-ea"/>
+                <a:cs typeface="+mn-cs"/>
+              </a:defRPr>
+            </a:lvl9pPr>
+          </a:lstStyle>
+          <a:p>
+            <a:pPr algn="ctr"/>
+            <a:r>
+              <a:rPr lang="pt-BR" sz="1600" dirty="0">
+                <a:latin typeface="Bariol Bold" panose="02000506040000020003"/>
+                <a:cs typeface="Arial"/>
+              </a:rPr>
+              <a:t>Assim o metrô utiliza esses dados para tomada de decisões operacionais em suas dependências.</a:t>
+            </a:r>
+          </a:p>
+        </p:txBody>
+      </p:sp>
       <p:pic>
         <p:nvPicPr>
-          <p:cNvPr id="3" name="Imagem 14">
+          <p:cNvPr id="9" name="Imagem 22">
             <a:extLst>
               <a:ext uri="{FF2B5EF4-FFF2-40B4-BE49-F238E27FC236}">
-                <a16:creationId xmlns:a16="http://schemas.microsoft.com/office/drawing/2014/main" id="{0102D479-09C2-49DB-A04B-2D35F705A0C8}"/>
+                <a16:creationId xmlns:a16="http://schemas.microsoft.com/office/drawing/2014/main" id="{CC39A08E-FA5A-4E74-8D88-F67EB8568251}"/>
               </a:ext>
             </a:extLst>
           </p:cNvPr>
@@ -3052,446 +3457,6 @@
         </p:blipFill>
         <p:spPr>
           <a:xfrm>
-            <a:off x="3548139" y="2053750"/>
-            <a:ext cx="2332204" cy="1636263"/>
-          </a:xfrm>
-          <a:prstGeom prst="rect">
-            <a:avLst/>
-          </a:prstGeom>
-        </p:spPr>
-      </p:pic>
-      <p:sp>
-        <p:nvSpPr>
-          <p:cNvPr id="4" name="CaixaDeTexto 17">
-            <a:extLst>
-              <a:ext uri="{FF2B5EF4-FFF2-40B4-BE49-F238E27FC236}">
-                <a16:creationId xmlns:a16="http://schemas.microsoft.com/office/drawing/2014/main" id="{8654993B-C2B9-4E5E-BA14-277418993EF0}"/>
-              </a:ext>
-            </a:extLst>
-          </p:cNvPr>
-          <p:cNvSpPr txBox="1"/>
-          <p:nvPr/>
-        </p:nvSpPr>
-        <p:spPr>
-          <a:xfrm>
-            <a:off x="3337897" y="3487126"/>
-            <a:ext cx="2592881" cy="1323439"/>
-          </a:xfrm>
-          <a:prstGeom prst="rect">
-            <a:avLst/>
-          </a:prstGeom>
-          <a:noFill/>
-        </p:spPr>
-        <p:txBody>
-          <a:bodyPr wrap="square" rtlCol="0" anchor="t">
-            <a:spAutoFit/>
-          </a:bodyPr>
-          <a:lstStyle>
-            <a:defPPr>
-              <a:defRPr lang="pt-BR"/>
-            </a:defPPr>
-            <a:lvl1pPr marL="0" algn="l" defTabSz="914400" rtl="0" eaLnBrk="1" latinLnBrk="0" hangingPunct="1">
-              <a:defRPr sz="1800" kern="1200">
-                <a:solidFill>
-                  <a:schemeClr val="tx1"/>
-                </a:solidFill>
-                <a:latin typeface="+mn-lt"/>
-                <a:ea typeface="+mn-ea"/>
-                <a:cs typeface="+mn-cs"/>
-              </a:defRPr>
-            </a:lvl1pPr>
-            <a:lvl2pPr marL="457200" algn="l" defTabSz="914400" rtl="0" eaLnBrk="1" latinLnBrk="0" hangingPunct="1">
-              <a:defRPr sz="1800" kern="1200">
-                <a:solidFill>
-                  <a:schemeClr val="tx1"/>
-                </a:solidFill>
-                <a:latin typeface="+mn-lt"/>
-                <a:ea typeface="+mn-ea"/>
-                <a:cs typeface="+mn-cs"/>
-              </a:defRPr>
-            </a:lvl2pPr>
-            <a:lvl3pPr marL="914400" algn="l" defTabSz="914400" rtl="0" eaLnBrk="1" latinLnBrk="0" hangingPunct="1">
-              <a:defRPr sz="1800" kern="1200">
-                <a:solidFill>
-                  <a:schemeClr val="tx1"/>
-                </a:solidFill>
-                <a:latin typeface="+mn-lt"/>
-                <a:ea typeface="+mn-ea"/>
-                <a:cs typeface="+mn-cs"/>
-              </a:defRPr>
-            </a:lvl3pPr>
-            <a:lvl4pPr marL="1371600" algn="l" defTabSz="914400" rtl="0" eaLnBrk="1" latinLnBrk="0" hangingPunct="1">
-              <a:defRPr sz="1800" kern="1200">
-                <a:solidFill>
-                  <a:schemeClr val="tx1"/>
-                </a:solidFill>
-                <a:latin typeface="+mn-lt"/>
-                <a:ea typeface="+mn-ea"/>
-                <a:cs typeface="+mn-cs"/>
-              </a:defRPr>
-            </a:lvl4pPr>
-            <a:lvl5pPr marL="1828800" algn="l" defTabSz="914400" rtl="0" eaLnBrk="1" latinLnBrk="0" hangingPunct="1">
-              <a:defRPr sz="1800" kern="1200">
-                <a:solidFill>
-                  <a:schemeClr val="tx1"/>
-                </a:solidFill>
-                <a:latin typeface="+mn-lt"/>
-                <a:ea typeface="+mn-ea"/>
-                <a:cs typeface="+mn-cs"/>
-              </a:defRPr>
-            </a:lvl5pPr>
-            <a:lvl6pPr marL="2286000" algn="l" defTabSz="914400" rtl="0" eaLnBrk="1" latinLnBrk="0" hangingPunct="1">
-              <a:defRPr sz="1800" kern="1200">
-                <a:solidFill>
-                  <a:schemeClr val="tx1"/>
-                </a:solidFill>
-                <a:latin typeface="+mn-lt"/>
-                <a:ea typeface="+mn-ea"/>
-                <a:cs typeface="+mn-cs"/>
-              </a:defRPr>
-            </a:lvl6pPr>
-            <a:lvl7pPr marL="2743200" algn="l" defTabSz="914400" rtl="0" eaLnBrk="1" latinLnBrk="0" hangingPunct="1">
-              <a:defRPr sz="1800" kern="1200">
-                <a:solidFill>
-                  <a:schemeClr val="tx1"/>
-                </a:solidFill>
-                <a:latin typeface="+mn-lt"/>
-                <a:ea typeface="+mn-ea"/>
-                <a:cs typeface="+mn-cs"/>
-              </a:defRPr>
-            </a:lvl7pPr>
-            <a:lvl8pPr marL="3200400" algn="l" defTabSz="914400" rtl="0" eaLnBrk="1" latinLnBrk="0" hangingPunct="1">
-              <a:defRPr sz="1800" kern="1200">
-                <a:solidFill>
-                  <a:schemeClr val="tx1"/>
-                </a:solidFill>
-                <a:latin typeface="+mn-lt"/>
-                <a:ea typeface="+mn-ea"/>
-                <a:cs typeface="+mn-cs"/>
-              </a:defRPr>
-            </a:lvl8pPr>
-            <a:lvl9pPr marL="3657600" algn="l" defTabSz="914400" rtl="0" eaLnBrk="1" latinLnBrk="0" hangingPunct="1">
-              <a:defRPr sz="1800" kern="1200">
-                <a:solidFill>
-                  <a:schemeClr val="tx1"/>
-                </a:solidFill>
-                <a:latin typeface="+mn-lt"/>
-                <a:ea typeface="+mn-ea"/>
-                <a:cs typeface="+mn-cs"/>
-              </a:defRPr>
-            </a:lvl9pPr>
-          </a:lstStyle>
-          <a:p>
-            <a:pPr algn="ctr"/>
-            <a:r>
-              <a:rPr lang="pt-BR" sz="1600" dirty="0">
-                <a:latin typeface="Bariol Bold" panose="02000506040000020003"/>
-                <a:cs typeface="Arial"/>
-              </a:rPr>
-              <a:t>O  sistema web determina com esses dados o nível de circulação de pessoas em um determinado local da estação.</a:t>
-            </a:r>
-          </a:p>
-        </p:txBody>
-      </p:sp>
-      <p:sp>
-        <p:nvSpPr>
-          <p:cNvPr id="5" name="CaixaDeTexto 18">
-            <a:extLst>
-              <a:ext uri="{FF2B5EF4-FFF2-40B4-BE49-F238E27FC236}">
-                <a16:creationId xmlns:a16="http://schemas.microsoft.com/office/drawing/2014/main" id="{1B2E5927-A1FF-4781-8F5A-3031D47EFCC5}"/>
-              </a:ext>
-            </a:extLst>
-          </p:cNvPr>
-          <p:cNvSpPr txBox="1"/>
-          <p:nvPr/>
-        </p:nvSpPr>
-        <p:spPr>
-          <a:xfrm>
-            <a:off x="338421" y="3582067"/>
-            <a:ext cx="2434584" cy="1077218"/>
-          </a:xfrm>
-          <a:prstGeom prst="rect">
-            <a:avLst/>
-          </a:prstGeom>
-          <a:noFill/>
-        </p:spPr>
-        <p:txBody>
-          <a:bodyPr wrap="square" rtlCol="0" anchor="t">
-            <a:spAutoFit/>
-          </a:bodyPr>
-          <a:lstStyle>
-            <a:defPPr>
-              <a:defRPr lang="pt-BR"/>
-            </a:defPPr>
-            <a:lvl1pPr marL="0" algn="l" defTabSz="914400" rtl="0" eaLnBrk="1" latinLnBrk="0" hangingPunct="1">
-              <a:defRPr sz="1800" kern="1200">
-                <a:solidFill>
-                  <a:schemeClr val="tx1"/>
-                </a:solidFill>
-                <a:latin typeface="+mn-lt"/>
-                <a:ea typeface="+mn-ea"/>
-                <a:cs typeface="+mn-cs"/>
-              </a:defRPr>
-            </a:lvl1pPr>
-            <a:lvl2pPr marL="457200" algn="l" defTabSz="914400" rtl="0" eaLnBrk="1" latinLnBrk="0" hangingPunct="1">
-              <a:defRPr sz="1800" kern="1200">
-                <a:solidFill>
-                  <a:schemeClr val="tx1"/>
-                </a:solidFill>
-                <a:latin typeface="+mn-lt"/>
-                <a:ea typeface="+mn-ea"/>
-                <a:cs typeface="+mn-cs"/>
-              </a:defRPr>
-            </a:lvl2pPr>
-            <a:lvl3pPr marL="914400" algn="l" defTabSz="914400" rtl="0" eaLnBrk="1" latinLnBrk="0" hangingPunct="1">
-              <a:defRPr sz="1800" kern="1200">
-                <a:solidFill>
-                  <a:schemeClr val="tx1"/>
-                </a:solidFill>
-                <a:latin typeface="+mn-lt"/>
-                <a:ea typeface="+mn-ea"/>
-                <a:cs typeface="+mn-cs"/>
-              </a:defRPr>
-            </a:lvl3pPr>
-            <a:lvl4pPr marL="1371600" algn="l" defTabSz="914400" rtl="0" eaLnBrk="1" latinLnBrk="0" hangingPunct="1">
-              <a:defRPr sz="1800" kern="1200">
-                <a:solidFill>
-                  <a:schemeClr val="tx1"/>
-                </a:solidFill>
-                <a:latin typeface="+mn-lt"/>
-                <a:ea typeface="+mn-ea"/>
-                <a:cs typeface="+mn-cs"/>
-              </a:defRPr>
-            </a:lvl4pPr>
-            <a:lvl5pPr marL="1828800" algn="l" defTabSz="914400" rtl="0" eaLnBrk="1" latinLnBrk="0" hangingPunct="1">
-              <a:defRPr sz="1800" kern="1200">
-                <a:solidFill>
-                  <a:schemeClr val="tx1"/>
-                </a:solidFill>
-                <a:latin typeface="+mn-lt"/>
-                <a:ea typeface="+mn-ea"/>
-                <a:cs typeface="+mn-cs"/>
-              </a:defRPr>
-            </a:lvl5pPr>
-            <a:lvl6pPr marL="2286000" algn="l" defTabSz="914400" rtl="0" eaLnBrk="1" latinLnBrk="0" hangingPunct="1">
-              <a:defRPr sz="1800" kern="1200">
-                <a:solidFill>
-                  <a:schemeClr val="tx1"/>
-                </a:solidFill>
-                <a:latin typeface="+mn-lt"/>
-                <a:ea typeface="+mn-ea"/>
-                <a:cs typeface="+mn-cs"/>
-              </a:defRPr>
-            </a:lvl6pPr>
-            <a:lvl7pPr marL="2743200" algn="l" defTabSz="914400" rtl="0" eaLnBrk="1" latinLnBrk="0" hangingPunct="1">
-              <a:defRPr sz="1800" kern="1200">
-                <a:solidFill>
-                  <a:schemeClr val="tx1"/>
-                </a:solidFill>
-                <a:latin typeface="+mn-lt"/>
-                <a:ea typeface="+mn-ea"/>
-                <a:cs typeface="+mn-cs"/>
-              </a:defRPr>
-            </a:lvl7pPr>
-            <a:lvl8pPr marL="3200400" algn="l" defTabSz="914400" rtl="0" eaLnBrk="1" latinLnBrk="0" hangingPunct="1">
-              <a:defRPr sz="1800" kern="1200">
-                <a:solidFill>
-                  <a:schemeClr val="tx1"/>
-                </a:solidFill>
-                <a:latin typeface="+mn-lt"/>
-                <a:ea typeface="+mn-ea"/>
-                <a:cs typeface="+mn-cs"/>
-              </a:defRPr>
-            </a:lvl8pPr>
-            <a:lvl9pPr marL="3657600" algn="l" defTabSz="914400" rtl="0" eaLnBrk="1" latinLnBrk="0" hangingPunct="1">
-              <a:defRPr sz="1800" kern="1200">
-                <a:solidFill>
-                  <a:schemeClr val="tx1"/>
-                </a:solidFill>
-                <a:latin typeface="+mn-lt"/>
-                <a:ea typeface="+mn-ea"/>
-                <a:cs typeface="+mn-cs"/>
-              </a:defRPr>
-            </a:lvl9pPr>
-          </a:lstStyle>
-          <a:p>
-            <a:pPr algn="ctr"/>
-            <a:r>
-              <a:rPr lang="pt-BR" sz="1600" dirty="0">
-                <a:latin typeface="Bariol Bold" panose="02000506040000020003"/>
-                <a:cs typeface="Arial"/>
-              </a:rPr>
-              <a:t>Coleta de dados através de sensor óptico reflexivo em estações do metrô.</a:t>
-            </a:r>
-          </a:p>
-          <a:p>
-            <a:endParaRPr lang="pt-BR" sz="1600" dirty="0">
-              <a:latin typeface="Bariol Bold" panose="02000506040000020003"/>
-            </a:endParaRPr>
-          </a:p>
-        </p:txBody>
-      </p:sp>
-      <p:sp>
-        <p:nvSpPr>
-          <p:cNvPr id="6" name="CaixaDeTexto 19">
-            <a:extLst>
-              <a:ext uri="{FF2B5EF4-FFF2-40B4-BE49-F238E27FC236}">
-                <a16:creationId xmlns:a16="http://schemas.microsoft.com/office/drawing/2014/main" id="{D90E817B-B8F8-478D-882E-57FF9F8629F6}"/>
-              </a:ext>
-            </a:extLst>
-          </p:cNvPr>
-          <p:cNvSpPr txBox="1"/>
-          <p:nvPr/>
-        </p:nvSpPr>
-        <p:spPr>
-          <a:xfrm>
-            <a:off x="6313814" y="3581069"/>
-            <a:ext cx="2600438" cy="1077218"/>
-          </a:xfrm>
-          <a:prstGeom prst="rect">
-            <a:avLst/>
-          </a:prstGeom>
-          <a:noFill/>
-        </p:spPr>
-        <p:txBody>
-          <a:bodyPr wrap="square" rtlCol="0" anchor="t">
-            <a:spAutoFit/>
-          </a:bodyPr>
-          <a:lstStyle>
-            <a:defPPr>
-              <a:defRPr lang="pt-BR"/>
-            </a:defPPr>
-            <a:lvl1pPr marL="0" algn="l" defTabSz="914400" rtl="0" eaLnBrk="1" latinLnBrk="0" hangingPunct="1">
-              <a:defRPr sz="1800" kern="1200">
-                <a:solidFill>
-                  <a:schemeClr val="tx1"/>
-                </a:solidFill>
-                <a:latin typeface="+mn-lt"/>
-                <a:ea typeface="+mn-ea"/>
-                <a:cs typeface="+mn-cs"/>
-              </a:defRPr>
-            </a:lvl1pPr>
-            <a:lvl2pPr marL="457200" algn="l" defTabSz="914400" rtl="0" eaLnBrk="1" latinLnBrk="0" hangingPunct="1">
-              <a:defRPr sz="1800" kern="1200">
-                <a:solidFill>
-                  <a:schemeClr val="tx1"/>
-                </a:solidFill>
-                <a:latin typeface="+mn-lt"/>
-                <a:ea typeface="+mn-ea"/>
-                <a:cs typeface="+mn-cs"/>
-              </a:defRPr>
-            </a:lvl2pPr>
-            <a:lvl3pPr marL="914400" algn="l" defTabSz="914400" rtl="0" eaLnBrk="1" latinLnBrk="0" hangingPunct="1">
-              <a:defRPr sz="1800" kern="1200">
-                <a:solidFill>
-                  <a:schemeClr val="tx1"/>
-                </a:solidFill>
-                <a:latin typeface="+mn-lt"/>
-                <a:ea typeface="+mn-ea"/>
-                <a:cs typeface="+mn-cs"/>
-              </a:defRPr>
-            </a:lvl3pPr>
-            <a:lvl4pPr marL="1371600" algn="l" defTabSz="914400" rtl="0" eaLnBrk="1" latinLnBrk="0" hangingPunct="1">
-              <a:defRPr sz="1800" kern="1200">
-                <a:solidFill>
-                  <a:schemeClr val="tx1"/>
-                </a:solidFill>
-                <a:latin typeface="+mn-lt"/>
-                <a:ea typeface="+mn-ea"/>
-                <a:cs typeface="+mn-cs"/>
-              </a:defRPr>
-            </a:lvl4pPr>
-            <a:lvl5pPr marL="1828800" algn="l" defTabSz="914400" rtl="0" eaLnBrk="1" latinLnBrk="0" hangingPunct="1">
-              <a:defRPr sz="1800" kern="1200">
-                <a:solidFill>
-                  <a:schemeClr val="tx1"/>
-                </a:solidFill>
-                <a:latin typeface="+mn-lt"/>
-                <a:ea typeface="+mn-ea"/>
-                <a:cs typeface="+mn-cs"/>
-              </a:defRPr>
-            </a:lvl5pPr>
-            <a:lvl6pPr marL="2286000" algn="l" defTabSz="914400" rtl="0" eaLnBrk="1" latinLnBrk="0" hangingPunct="1">
-              <a:defRPr sz="1800" kern="1200">
-                <a:solidFill>
-                  <a:schemeClr val="tx1"/>
-                </a:solidFill>
-                <a:latin typeface="+mn-lt"/>
-                <a:ea typeface="+mn-ea"/>
-                <a:cs typeface="+mn-cs"/>
-              </a:defRPr>
-            </a:lvl6pPr>
-            <a:lvl7pPr marL="2743200" algn="l" defTabSz="914400" rtl="0" eaLnBrk="1" latinLnBrk="0" hangingPunct="1">
-              <a:defRPr sz="1800" kern="1200">
-                <a:solidFill>
-                  <a:schemeClr val="tx1"/>
-                </a:solidFill>
-                <a:latin typeface="+mn-lt"/>
-                <a:ea typeface="+mn-ea"/>
-                <a:cs typeface="+mn-cs"/>
-              </a:defRPr>
-            </a:lvl7pPr>
-            <a:lvl8pPr marL="3200400" algn="l" defTabSz="914400" rtl="0" eaLnBrk="1" latinLnBrk="0" hangingPunct="1">
-              <a:defRPr sz="1800" kern="1200">
-                <a:solidFill>
-                  <a:schemeClr val="tx1"/>
-                </a:solidFill>
-                <a:latin typeface="+mn-lt"/>
-                <a:ea typeface="+mn-ea"/>
-                <a:cs typeface="+mn-cs"/>
-              </a:defRPr>
-            </a:lvl8pPr>
-            <a:lvl9pPr marL="3657600" algn="l" defTabSz="914400" rtl="0" eaLnBrk="1" latinLnBrk="0" hangingPunct="1">
-              <a:defRPr sz="1800" kern="1200">
-                <a:solidFill>
-                  <a:schemeClr val="tx1"/>
-                </a:solidFill>
-                <a:latin typeface="+mn-lt"/>
-                <a:ea typeface="+mn-ea"/>
-                <a:cs typeface="+mn-cs"/>
-              </a:defRPr>
-            </a:lvl9pPr>
-          </a:lstStyle>
-          <a:p>
-            <a:pPr algn="ctr"/>
-            <a:r>
-              <a:rPr lang="pt-BR" sz="1600" dirty="0">
-                <a:latin typeface="Bariol Bold" panose="02000506040000020003"/>
-                <a:cs typeface="Arial"/>
-              </a:rPr>
-              <a:t>Assim o metrô utiliza esses dados para tomada de decisões operacionais em suas dependências.</a:t>
-            </a:r>
-          </a:p>
-        </p:txBody>
-      </p:sp>
-      <p:pic>
-        <p:nvPicPr>
-          <p:cNvPr id="9" name="Imagem 22">
-            <a:extLst>
-              <a:ext uri="{FF2B5EF4-FFF2-40B4-BE49-F238E27FC236}">
-                <a16:creationId xmlns:a16="http://schemas.microsoft.com/office/drawing/2014/main" id="{CC39A08E-FA5A-4E74-8D88-F67EB8568251}"/>
-              </a:ext>
-            </a:extLst>
-          </p:cNvPr>
-          <p:cNvPicPr>
-            <a:picLocks noChangeAspect="1"/>
-          </p:cNvPicPr>
-          <p:nvPr/>
-        </p:nvPicPr>
-        <p:blipFill>
-          <a:blip r:embed="rId4" cstate="print">
-            <a:extLst>
-              <a:ext uri="{28A0092B-C50C-407E-A947-70E740481C1C}">
-                <a14:useLocalDpi xmlns:a14="http://schemas.microsoft.com/office/drawing/2010/main" val="0"/>
-              </a:ext>
-            </a:extLst>
-          </a:blip>
-          <a:stretch>
-            <a:fillRect/>
-          </a:stretch>
-        </p:blipFill>
-        <p:spPr>
-          <a:xfrm>
             <a:off x="9825538" y="3408574"/>
             <a:ext cx="1953314" cy="1473180"/>
           </a:xfrm>
@@ -3781,7 +3746,7 @@
           <p:nvPr/>
         </p:nvPicPr>
         <p:blipFill>
-          <a:blip r:embed="rId5" cstate="print">
+          <a:blip r:embed="rId4" cstate="print">
             <a:extLst>
               <a:ext uri="{28A0092B-C50C-407E-A947-70E740481C1C}">
                 <a14:useLocalDpi xmlns:a14="http://schemas.microsoft.com/office/drawing/2010/main" val="0"/>
@@ -3901,7 +3866,7 @@
           <p:nvPr/>
         </p:nvPicPr>
         <p:blipFill>
-          <a:blip r:embed="rId6" cstate="hqprint">
+          <a:blip r:embed="rId5" cstate="hqprint">
             <a:extLst>
               <a:ext uri="{28A0092B-C50C-407E-A947-70E740481C1C}">
                 <a14:useLocalDpi xmlns:a14="http://schemas.microsoft.com/office/drawing/2010/main" val="0"/>
@@ -4092,6 +4057,36 @@
           </a:fontRef>
         </p:style>
       </p:cxnSp>
+      <p:pic>
+        <p:nvPicPr>
+          <p:cNvPr id="7" name="Picture 7" descr="A picture containing table, rack&#10;&#10;Description generated with very high confidence">
+            <a:extLst>
+              <a:ext uri="{FF2B5EF4-FFF2-40B4-BE49-F238E27FC236}">
+                <a16:creationId xmlns:a16="http://schemas.microsoft.com/office/drawing/2014/main" id="{BB088FC8-76AB-4356-AAC5-4A0F18D85FAD}"/>
+              </a:ext>
+            </a:extLst>
+          </p:cNvPr>
+          <p:cNvPicPr>
+            <a:picLocks noChangeAspect="1"/>
+          </p:cNvPicPr>
+          <p:nvPr/>
+        </p:nvPicPr>
+        <p:blipFill>
+          <a:blip r:embed="rId6"/>
+          <a:stretch>
+            <a:fillRect/>
+          </a:stretch>
+        </p:blipFill>
+        <p:spPr>
+          <a:xfrm>
+            <a:off x="647700" y="1943100"/>
+            <a:ext cx="1743075" cy="1638300"/>
+          </a:xfrm>
+          <a:prstGeom prst="rect">
+            <a:avLst/>
+          </a:prstGeom>
+        </p:spPr>
+      </p:pic>
     </p:spTree>
     <p:extLst>
       <p:ext uri="{BB962C8B-B14F-4D97-AF65-F5344CB8AC3E}">
@@ -5730,6 +5725,134 @@
           </a:prstGeom>
         </p:spPr>
       </p:pic>
+      <p:sp>
+        <p:nvSpPr>
+          <p:cNvPr id="5" name="TextBox 4">
+            <a:extLst>
+              <a:ext uri="{FF2B5EF4-FFF2-40B4-BE49-F238E27FC236}">
+                <a16:creationId xmlns:a16="http://schemas.microsoft.com/office/drawing/2014/main" id="{3B730039-8792-41FE-892B-18D5A986DADE}"/>
+              </a:ext>
+            </a:extLst>
+          </p:cNvPr>
+          <p:cNvSpPr txBox="1"/>
+          <p:nvPr/>
+        </p:nvSpPr>
+        <p:spPr>
+          <a:xfrm>
+            <a:off x="8458200" y="3895725"/>
+            <a:ext cx="2743200" cy="369332"/>
+          </a:xfrm>
+          <a:prstGeom prst="rect">
+            <a:avLst/>
+          </a:prstGeom>
+          <a:noFill/>
+        </p:spPr>
+        <p:txBody>
+          <a:bodyPr rot="0" spcFirstLastPara="0" vertOverflow="overflow" horzOverflow="overflow" vert="horz" wrap="square" lIns="91440" tIns="45720" rIns="91440" bIns="45720" numCol="1" spcCol="0" rtlCol="0" fromWordArt="0" anchor="t" anchorCtr="0" forceAA="0" compatLnSpc="1">
+            <a:prstTxWarp prst="textNoShape">
+              <a:avLst/>
+            </a:prstTxWarp>
+            <a:spAutoFit/>
+          </a:bodyPr>
+          <a:lstStyle/>
+          <a:p>
+            <a:r>
+              <a:rPr lang="en-US" b="1" dirty="0">
+                <a:solidFill>
+                  <a:schemeClr val="tx2">
+                    <a:lumMod val="75000"/>
+                  </a:schemeClr>
+                </a:solidFill>
+                <a:cs typeface="Calibri"/>
+              </a:rPr>
+              <a:t>Lado </a:t>
+            </a:r>
+            <a:r>
+              <a:rPr lang="en-US" b="1" dirty="0" err="1">
+                <a:solidFill>
+                  <a:schemeClr val="tx2">
+                    <a:lumMod val="75000"/>
+                  </a:schemeClr>
+                </a:solidFill>
+                <a:cs typeface="Calibri"/>
+              </a:rPr>
+              <a:t>cliente</a:t>
+            </a:r>
+            <a:endParaRPr lang="en-US" b="1" dirty="0">
+              <a:solidFill>
+                <a:schemeClr val="tx2">
+                  <a:lumMod val="75000"/>
+                </a:schemeClr>
+              </a:solidFill>
+              <a:cs typeface="Calibri"/>
+            </a:endParaRPr>
+          </a:p>
+        </p:txBody>
+      </p:sp>
+      <p:sp>
+        <p:nvSpPr>
+          <p:cNvPr id="47" name="TextBox 46">
+            <a:extLst>
+              <a:ext uri="{FF2B5EF4-FFF2-40B4-BE49-F238E27FC236}">
+                <a16:creationId xmlns:a16="http://schemas.microsoft.com/office/drawing/2014/main" id="{376A5687-48A8-40F5-9BFE-A3E9F2C5E338}"/>
+              </a:ext>
+            </a:extLst>
+          </p:cNvPr>
+          <p:cNvSpPr txBox="1"/>
+          <p:nvPr/>
+        </p:nvSpPr>
+        <p:spPr>
+          <a:xfrm>
+            <a:off x="3714750" y="3876674"/>
+            <a:ext cx="2743200" cy="369332"/>
+          </a:xfrm>
+          <a:prstGeom prst="rect">
+            <a:avLst/>
+          </a:prstGeom>
+          <a:noFill/>
+        </p:spPr>
+        <p:txBody>
+          <a:bodyPr rot="0" spcFirstLastPara="0" vertOverflow="overflow" horzOverflow="overflow" vert="horz" wrap="square" lIns="91440" tIns="45720" rIns="91440" bIns="45720" numCol="1" spcCol="0" rtlCol="0" fromWordArt="0" anchor="t" anchorCtr="0" forceAA="0" compatLnSpc="1">
+            <a:prstTxWarp prst="textNoShape">
+              <a:avLst/>
+            </a:prstTxWarp>
+            <a:spAutoFit/>
+          </a:bodyPr>
+          <a:lstStyle/>
+          <a:p>
+            <a:r>
+              <a:rPr lang="en-US" b="1" dirty="0">
+                <a:solidFill>
+                  <a:schemeClr val="tx2">
+                    <a:lumMod val="75000"/>
+                  </a:schemeClr>
+                </a:solidFill>
+                <a:cs typeface="Calibri"/>
+              </a:rPr>
+              <a:t>Lado </a:t>
+            </a:r>
+            <a:r>
+              <a:rPr lang="en-US" b="1" dirty="0" err="1">
+                <a:solidFill>
+                  <a:schemeClr val="tx2">
+                    <a:lumMod val="75000"/>
+                  </a:schemeClr>
+                </a:solidFill>
+                <a:cs typeface="Calibri"/>
+              </a:rPr>
+              <a:t>desenvolvedor</a:t>
+            </a:r>
+            <a:endParaRPr lang="en-US" b="1" dirty="0">
+              <a:solidFill>
+                <a:schemeClr val="tx2">
+                  <a:lumMod val="75000"/>
+                </a:schemeClr>
+              </a:solidFill>
+              <a:cs typeface="Calibri"/>
+            </a:endParaRPr>
+          </a:p>
+        </p:txBody>
+      </p:sp>
     </p:spTree>
     <p:extLst>
       <p:ext uri="{BB962C8B-B14F-4D97-AF65-F5344CB8AC3E}">

</xml_diff>